<commit_message>
con loi tien hang
</commit_message>
<xml_diff>
--- a/HT_QLLINHKIEN/Báo cáo thực tập.pptx
+++ b/HT_QLLINHKIEN/Báo cáo thực tập.pptx
@@ -133,20 +133,6 @@
 </p:cmAuthorLst>
 </file>
 
-<file path=ppt/comments/comment1.xml><?xml version="1.0" encoding="utf-8"?>
-<p:cmLst xmlns:a="http://schemas.openxmlformats.org/drawingml/2006/main" xmlns:r="http://schemas.openxmlformats.org/officeDocument/2006/relationships" xmlns:p="http://schemas.openxmlformats.org/presentationml/2006/main">
-  <p:cm authorId="1" dt="2019-12-12T19:09:14.874" idx="1">
-    <p:pos x="10" y="10"/>
-    <p:text/>
-    <p:extLst>
-      <p:ext uri="{C676402C-5697-4E1C-873F-D02D1690AC5C}">
-        <p15:threadingInfo xmlns:p15="http://schemas.microsoft.com/office/powerpoint/2012/main" timeZoneBias="-420"/>
-      </p:ext>
-    </p:extLst>
-  </p:cm>
-</p:cmLst>
-</file>
-
 <file path=ppt/slideLayouts/slideLayout1.xml><?xml version="1.0" encoding="utf-8"?>
 <p:sldLayout xmlns:a="http://schemas.openxmlformats.org/drawingml/2006/main" xmlns:r="http://schemas.openxmlformats.org/officeDocument/2006/relationships" xmlns:p="http://schemas.openxmlformats.org/presentationml/2006/main" type="title" preserve="1">
   <p:cSld name="Tiêu đề Bản chiếu">
@@ -318,7 +304,7 @@
           <a:p>
             <a:fld id="{11F06DAA-CA6F-455D-A0C4-2D4B122CBFFB}" type="datetimeFigureOut">
               <a:rPr lang="en-US" smtClean="0"/>
-              <a:t>12/14/2019</a:t>
+              <a:t>12/18/2019</a:t>
             </a:fld>
             <a:endParaRPr lang="en-US"/>
           </a:p>
@@ -630,7 +616,7 @@
           <a:p>
             <a:fld id="{11F06DAA-CA6F-455D-A0C4-2D4B122CBFFB}" type="datetimeFigureOut">
               <a:rPr lang="en-US" smtClean="0"/>
-              <a:t>12/14/2019</a:t>
+              <a:t>12/18/2019</a:t>
             </a:fld>
             <a:endParaRPr lang="en-US"/>
           </a:p>
@@ -852,7 +838,7 @@
           <a:p>
             <a:fld id="{11F06DAA-CA6F-455D-A0C4-2D4B122CBFFB}" type="datetimeFigureOut">
               <a:rPr lang="en-US" smtClean="0"/>
-              <a:t>12/14/2019</a:t>
+              <a:t>12/18/2019</a:t>
             </a:fld>
             <a:endParaRPr lang="en-US"/>
           </a:p>
@@ -1143,7 +1129,7 @@
           <a:p>
             <a:fld id="{11F06DAA-CA6F-455D-A0C4-2D4B122CBFFB}" type="datetimeFigureOut">
               <a:rPr lang="en-US" smtClean="0"/>
-              <a:t>12/14/2019</a:t>
+              <a:t>12/18/2019</a:t>
             </a:fld>
             <a:endParaRPr lang="en-US"/>
           </a:p>
@@ -1597,7 +1583,7 @@
           <a:p>
             <a:fld id="{11F06DAA-CA6F-455D-A0C4-2D4B122CBFFB}" type="datetimeFigureOut">
               <a:rPr lang="en-US" smtClean="0"/>
-              <a:t>12/14/2019</a:t>
+              <a:t>12/18/2019</a:t>
             </a:fld>
             <a:endParaRPr lang="en-US"/>
           </a:p>
@@ -2173,7 +2159,7 @@
           <a:p>
             <a:fld id="{11F06DAA-CA6F-455D-A0C4-2D4B122CBFFB}" type="datetimeFigureOut">
               <a:rPr lang="en-US" smtClean="0"/>
-              <a:t>12/14/2019</a:t>
+              <a:t>12/18/2019</a:t>
             </a:fld>
             <a:endParaRPr lang="en-US"/>
           </a:p>
@@ -3025,7 +3011,7 @@
           <a:p>
             <a:fld id="{11F06DAA-CA6F-455D-A0C4-2D4B122CBFFB}" type="datetimeFigureOut">
               <a:rPr lang="en-US" smtClean="0"/>
-              <a:t>12/14/2019</a:t>
+              <a:t>12/18/2019</a:t>
             </a:fld>
             <a:endParaRPr lang="en-US"/>
           </a:p>
@@ -3230,7 +3216,7 @@
           <a:p>
             <a:fld id="{11F06DAA-CA6F-455D-A0C4-2D4B122CBFFB}" type="datetimeFigureOut">
               <a:rPr lang="en-US" smtClean="0"/>
-              <a:t>12/14/2019</a:t>
+              <a:t>12/18/2019</a:t>
             </a:fld>
             <a:endParaRPr lang="en-US"/>
           </a:p>
@@ -3444,7 +3430,7 @@
           <a:p>
             <a:fld id="{11F06DAA-CA6F-455D-A0C4-2D4B122CBFFB}" type="datetimeFigureOut">
               <a:rPr lang="en-US" smtClean="0"/>
-              <a:t>12/14/2019</a:t>
+              <a:t>12/18/2019</a:t>
             </a:fld>
             <a:endParaRPr lang="en-US"/>
           </a:p>
@@ -3649,7 +3635,7 @@
           <a:p>
             <a:fld id="{11F06DAA-CA6F-455D-A0C4-2D4B122CBFFB}" type="datetimeFigureOut">
               <a:rPr lang="en-US" smtClean="0"/>
-              <a:t>12/14/2019</a:t>
+              <a:t>12/18/2019</a:t>
             </a:fld>
             <a:endParaRPr lang="en-US"/>
           </a:p>
@@ -3929,7 +3915,7 @@
           <a:p>
             <a:fld id="{11F06DAA-CA6F-455D-A0C4-2D4B122CBFFB}" type="datetimeFigureOut">
               <a:rPr lang="en-US" smtClean="0"/>
-              <a:t>12/14/2019</a:t>
+              <a:t>12/18/2019</a:t>
             </a:fld>
             <a:endParaRPr lang="en-US"/>
           </a:p>
@@ -4196,7 +4182,7 @@
           <a:p>
             <a:fld id="{11F06DAA-CA6F-455D-A0C4-2D4B122CBFFB}" type="datetimeFigureOut">
               <a:rPr lang="en-US" smtClean="0"/>
-              <a:t>12/14/2019</a:t>
+              <a:t>12/18/2019</a:t>
             </a:fld>
             <a:endParaRPr lang="en-US"/>
           </a:p>
@@ -4611,7 +4597,7 @@
           <a:p>
             <a:fld id="{11F06DAA-CA6F-455D-A0C4-2D4B122CBFFB}" type="datetimeFigureOut">
               <a:rPr lang="en-US" smtClean="0"/>
-              <a:t>12/14/2019</a:t>
+              <a:t>12/18/2019</a:t>
             </a:fld>
             <a:endParaRPr lang="en-US"/>
           </a:p>
@@ -4759,7 +4745,7 @@
           <a:p>
             <a:fld id="{11F06DAA-CA6F-455D-A0C4-2D4B122CBFFB}" type="datetimeFigureOut">
               <a:rPr lang="en-US" smtClean="0"/>
-              <a:t>12/14/2019</a:t>
+              <a:t>12/18/2019</a:t>
             </a:fld>
             <a:endParaRPr lang="en-US"/>
           </a:p>
@@ -4884,7 +4870,7 @@
           <a:p>
             <a:fld id="{11F06DAA-CA6F-455D-A0C4-2D4B122CBFFB}" type="datetimeFigureOut">
               <a:rPr lang="en-US" smtClean="0"/>
-              <a:t>12/14/2019</a:t>
+              <a:t>12/18/2019</a:t>
             </a:fld>
             <a:endParaRPr lang="en-US"/>
           </a:p>
@@ -5163,7 +5149,7 @@
           <a:p>
             <a:fld id="{11F06DAA-CA6F-455D-A0C4-2D4B122CBFFB}" type="datetimeFigureOut">
               <a:rPr lang="en-US" smtClean="0"/>
-              <a:t>12/14/2019</a:t>
+              <a:t>12/18/2019</a:t>
             </a:fld>
             <a:endParaRPr lang="en-US"/>
           </a:p>
@@ -5475,7 +5461,7 @@
           <a:p>
             <a:fld id="{11F06DAA-CA6F-455D-A0C4-2D4B122CBFFB}" type="datetimeFigureOut">
               <a:rPr lang="en-US" smtClean="0"/>
-              <a:t>12/14/2019</a:t>
+              <a:t>12/18/2019</a:t>
             </a:fld>
             <a:endParaRPr lang="en-US"/>
           </a:p>
@@ -5728,7 +5714,7 @@
           <a:p>
             <a:fld id="{11F06DAA-CA6F-455D-A0C4-2D4B122CBFFB}" type="datetimeFigureOut">
               <a:rPr lang="en-US" smtClean="0"/>
-              <a:t>12/14/2019</a:t>
+              <a:t>12/18/2019</a:t>
             </a:fld>
             <a:endParaRPr lang="en-US"/>
           </a:p>

</xml_diff>

<commit_message>
thay doi 2 thu muc
</commit_message>
<xml_diff>
--- a/HT_QLLINHKIEN/Báo cáo thực tập.pptx
+++ b/HT_QLLINHKIEN/Báo cáo thực tập.pptx
@@ -133,20 +133,6 @@
 </p:cmAuthorLst>
 </file>
 
-<file path=ppt/comments/comment1.xml><?xml version="1.0" encoding="utf-8"?>
-<p:cmLst xmlns:a="http://schemas.openxmlformats.org/drawingml/2006/main" xmlns:r="http://schemas.openxmlformats.org/officeDocument/2006/relationships" xmlns:p="http://schemas.openxmlformats.org/presentationml/2006/main">
-  <p:cm authorId="1" dt="2019-12-12T19:09:14.874" idx="1">
-    <p:pos x="10" y="10"/>
-    <p:text/>
-    <p:extLst>
-      <p:ext uri="{C676402C-5697-4E1C-873F-D02D1690AC5C}">
-        <p15:threadingInfo xmlns:p15="http://schemas.microsoft.com/office/powerpoint/2012/main" timeZoneBias="-420"/>
-      </p:ext>
-    </p:extLst>
-  </p:cm>
-</p:cmLst>
-</file>
-
 <file path=ppt/slideLayouts/slideLayout1.xml><?xml version="1.0" encoding="utf-8"?>
 <p:sldLayout xmlns:a="http://schemas.openxmlformats.org/drawingml/2006/main" xmlns:r="http://schemas.openxmlformats.org/officeDocument/2006/relationships" xmlns:p="http://schemas.openxmlformats.org/presentationml/2006/main" type="title" preserve="1">
   <p:cSld name="Tiêu đề Bản chiếu">
@@ -318,7 +304,7 @@
           <a:p>
             <a:fld id="{11F06DAA-CA6F-455D-A0C4-2D4B122CBFFB}" type="datetimeFigureOut">
               <a:rPr lang="en-US" smtClean="0"/>
-              <a:t>12/14/2019</a:t>
+              <a:t>12/18/2019</a:t>
             </a:fld>
             <a:endParaRPr lang="en-US"/>
           </a:p>
@@ -630,7 +616,7 @@
           <a:p>
             <a:fld id="{11F06DAA-CA6F-455D-A0C4-2D4B122CBFFB}" type="datetimeFigureOut">
               <a:rPr lang="en-US" smtClean="0"/>
-              <a:t>12/14/2019</a:t>
+              <a:t>12/18/2019</a:t>
             </a:fld>
             <a:endParaRPr lang="en-US"/>
           </a:p>
@@ -852,7 +838,7 @@
           <a:p>
             <a:fld id="{11F06DAA-CA6F-455D-A0C4-2D4B122CBFFB}" type="datetimeFigureOut">
               <a:rPr lang="en-US" smtClean="0"/>
-              <a:t>12/14/2019</a:t>
+              <a:t>12/18/2019</a:t>
             </a:fld>
             <a:endParaRPr lang="en-US"/>
           </a:p>
@@ -1143,7 +1129,7 @@
           <a:p>
             <a:fld id="{11F06DAA-CA6F-455D-A0C4-2D4B122CBFFB}" type="datetimeFigureOut">
               <a:rPr lang="en-US" smtClean="0"/>
-              <a:t>12/14/2019</a:t>
+              <a:t>12/18/2019</a:t>
             </a:fld>
             <a:endParaRPr lang="en-US"/>
           </a:p>
@@ -1597,7 +1583,7 @@
           <a:p>
             <a:fld id="{11F06DAA-CA6F-455D-A0C4-2D4B122CBFFB}" type="datetimeFigureOut">
               <a:rPr lang="en-US" smtClean="0"/>
-              <a:t>12/14/2019</a:t>
+              <a:t>12/18/2019</a:t>
             </a:fld>
             <a:endParaRPr lang="en-US"/>
           </a:p>
@@ -2173,7 +2159,7 @@
           <a:p>
             <a:fld id="{11F06DAA-CA6F-455D-A0C4-2D4B122CBFFB}" type="datetimeFigureOut">
               <a:rPr lang="en-US" smtClean="0"/>
-              <a:t>12/14/2019</a:t>
+              <a:t>12/18/2019</a:t>
             </a:fld>
             <a:endParaRPr lang="en-US"/>
           </a:p>
@@ -3025,7 +3011,7 @@
           <a:p>
             <a:fld id="{11F06DAA-CA6F-455D-A0C4-2D4B122CBFFB}" type="datetimeFigureOut">
               <a:rPr lang="en-US" smtClean="0"/>
-              <a:t>12/14/2019</a:t>
+              <a:t>12/18/2019</a:t>
             </a:fld>
             <a:endParaRPr lang="en-US"/>
           </a:p>
@@ -3230,7 +3216,7 @@
           <a:p>
             <a:fld id="{11F06DAA-CA6F-455D-A0C4-2D4B122CBFFB}" type="datetimeFigureOut">
               <a:rPr lang="en-US" smtClean="0"/>
-              <a:t>12/14/2019</a:t>
+              <a:t>12/18/2019</a:t>
             </a:fld>
             <a:endParaRPr lang="en-US"/>
           </a:p>
@@ -3444,7 +3430,7 @@
           <a:p>
             <a:fld id="{11F06DAA-CA6F-455D-A0C4-2D4B122CBFFB}" type="datetimeFigureOut">
               <a:rPr lang="en-US" smtClean="0"/>
-              <a:t>12/14/2019</a:t>
+              <a:t>12/18/2019</a:t>
             </a:fld>
             <a:endParaRPr lang="en-US"/>
           </a:p>
@@ -3649,7 +3635,7 @@
           <a:p>
             <a:fld id="{11F06DAA-CA6F-455D-A0C4-2D4B122CBFFB}" type="datetimeFigureOut">
               <a:rPr lang="en-US" smtClean="0"/>
-              <a:t>12/14/2019</a:t>
+              <a:t>12/18/2019</a:t>
             </a:fld>
             <a:endParaRPr lang="en-US"/>
           </a:p>
@@ -3929,7 +3915,7 @@
           <a:p>
             <a:fld id="{11F06DAA-CA6F-455D-A0C4-2D4B122CBFFB}" type="datetimeFigureOut">
               <a:rPr lang="en-US" smtClean="0"/>
-              <a:t>12/14/2019</a:t>
+              <a:t>12/18/2019</a:t>
             </a:fld>
             <a:endParaRPr lang="en-US"/>
           </a:p>
@@ -4196,7 +4182,7 @@
           <a:p>
             <a:fld id="{11F06DAA-CA6F-455D-A0C4-2D4B122CBFFB}" type="datetimeFigureOut">
               <a:rPr lang="en-US" smtClean="0"/>
-              <a:t>12/14/2019</a:t>
+              <a:t>12/18/2019</a:t>
             </a:fld>
             <a:endParaRPr lang="en-US"/>
           </a:p>
@@ -4611,7 +4597,7 @@
           <a:p>
             <a:fld id="{11F06DAA-CA6F-455D-A0C4-2D4B122CBFFB}" type="datetimeFigureOut">
               <a:rPr lang="en-US" smtClean="0"/>
-              <a:t>12/14/2019</a:t>
+              <a:t>12/18/2019</a:t>
             </a:fld>
             <a:endParaRPr lang="en-US"/>
           </a:p>
@@ -4759,7 +4745,7 @@
           <a:p>
             <a:fld id="{11F06DAA-CA6F-455D-A0C4-2D4B122CBFFB}" type="datetimeFigureOut">
               <a:rPr lang="en-US" smtClean="0"/>
-              <a:t>12/14/2019</a:t>
+              <a:t>12/18/2019</a:t>
             </a:fld>
             <a:endParaRPr lang="en-US"/>
           </a:p>
@@ -4884,7 +4870,7 @@
           <a:p>
             <a:fld id="{11F06DAA-CA6F-455D-A0C4-2D4B122CBFFB}" type="datetimeFigureOut">
               <a:rPr lang="en-US" smtClean="0"/>
-              <a:t>12/14/2019</a:t>
+              <a:t>12/18/2019</a:t>
             </a:fld>
             <a:endParaRPr lang="en-US"/>
           </a:p>
@@ -5163,7 +5149,7 @@
           <a:p>
             <a:fld id="{11F06DAA-CA6F-455D-A0C4-2D4B122CBFFB}" type="datetimeFigureOut">
               <a:rPr lang="en-US" smtClean="0"/>
-              <a:t>12/14/2019</a:t>
+              <a:t>12/18/2019</a:t>
             </a:fld>
             <a:endParaRPr lang="en-US"/>
           </a:p>
@@ -5475,7 +5461,7 @@
           <a:p>
             <a:fld id="{11F06DAA-CA6F-455D-A0C4-2D4B122CBFFB}" type="datetimeFigureOut">
               <a:rPr lang="en-US" smtClean="0"/>
-              <a:t>12/14/2019</a:t>
+              <a:t>12/18/2019</a:t>
             </a:fld>
             <a:endParaRPr lang="en-US"/>
           </a:p>
@@ -5728,7 +5714,7 @@
           <a:p>
             <a:fld id="{11F06DAA-CA6F-455D-A0C4-2D4B122CBFFB}" type="datetimeFigureOut">
               <a:rPr lang="en-US" smtClean="0"/>
-              <a:t>12/14/2019</a:t>
+              <a:t>12/18/2019</a:t>
             </a:fld>
             <a:endParaRPr lang="en-US"/>
           </a:p>

</xml_diff>